<commit_message>
Final pieces of BW Oct
</commit_message>
<xml_diff>
--- a/Posts/2020/Oct/Common Cents/Election_Economics_Art.pptx
+++ b/Posts/2020/Oct/Common Cents/Election_Economics_Art.pptx
@@ -107,6 +107,11 @@
       </a:defRPr>
     </a:lvl9pPr>
   </p:defaultTextStyle>
+  <p:extLst>
+    <p:ext uri="{EFAFB233-063F-42B5-8137-9DF3F51BA10A}">
+      <p15:sldGuideLst xmlns:p15="http://schemas.microsoft.com/office/powerpoint/2012/main"/>
+    </p:ext>
+  </p:extLst>
 </p:presentation>
 </file>
 
@@ -257,7 +262,7 @@
           <a:p>
             <a:fld id="{5B9580D5-5BBC-4C12-BE84-A18EAD3A5D00}" type="datetimeFigureOut">
               <a:rPr lang="en-US" smtClean="0"/>
-              <a:t>10/29/2020</a:t>
+              <a:t>10/31/2020</a:t>
             </a:fld>
             <a:endParaRPr lang="en-US"/>
           </a:p>
@@ -455,7 +460,7 @@
           <a:p>
             <a:fld id="{5B9580D5-5BBC-4C12-BE84-A18EAD3A5D00}" type="datetimeFigureOut">
               <a:rPr lang="en-US" smtClean="0"/>
-              <a:t>10/29/2020</a:t>
+              <a:t>10/31/2020</a:t>
             </a:fld>
             <a:endParaRPr lang="en-US"/>
           </a:p>
@@ -663,7 +668,7 @@
           <a:p>
             <a:fld id="{5B9580D5-5BBC-4C12-BE84-A18EAD3A5D00}" type="datetimeFigureOut">
               <a:rPr lang="en-US" smtClean="0"/>
-              <a:t>10/29/2020</a:t>
+              <a:t>10/31/2020</a:t>
             </a:fld>
             <a:endParaRPr lang="en-US"/>
           </a:p>
@@ -861,7 +866,7 @@
           <a:p>
             <a:fld id="{5B9580D5-5BBC-4C12-BE84-A18EAD3A5D00}" type="datetimeFigureOut">
               <a:rPr lang="en-US" smtClean="0"/>
-              <a:t>10/29/2020</a:t>
+              <a:t>10/31/2020</a:t>
             </a:fld>
             <a:endParaRPr lang="en-US"/>
           </a:p>
@@ -1136,7 +1141,7 @@
           <a:p>
             <a:fld id="{5B9580D5-5BBC-4C12-BE84-A18EAD3A5D00}" type="datetimeFigureOut">
               <a:rPr lang="en-US" smtClean="0"/>
-              <a:t>10/29/2020</a:t>
+              <a:t>10/31/2020</a:t>
             </a:fld>
             <a:endParaRPr lang="en-US"/>
           </a:p>
@@ -1401,7 +1406,7 @@
           <a:p>
             <a:fld id="{5B9580D5-5BBC-4C12-BE84-A18EAD3A5D00}" type="datetimeFigureOut">
               <a:rPr lang="en-US" smtClean="0"/>
-              <a:t>10/29/2020</a:t>
+              <a:t>10/31/2020</a:t>
             </a:fld>
             <a:endParaRPr lang="en-US"/>
           </a:p>
@@ -1813,7 +1818,7 @@
           <a:p>
             <a:fld id="{5B9580D5-5BBC-4C12-BE84-A18EAD3A5D00}" type="datetimeFigureOut">
               <a:rPr lang="en-US" smtClean="0"/>
-              <a:t>10/29/2020</a:t>
+              <a:t>10/31/2020</a:t>
             </a:fld>
             <a:endParaRPr lang="en-US"/>
           </a:p>
@@ -1954,7 +1959,7 @@
           <a:p>
             <a:fld id="{5B9580D5-5BBC-4C12-BE84-A18EAD3A5D00}" type="datetimeFigureOut">
               <a:rPr lang="en-US" smtClean="0"/>
-              <a:t>10/29/2020</a:t>
+              <a:t>10/31/2020</a:t>
             </a:fld>
             <a:endParaRPr lang="en-US"/>
           </a:p>
@@ -2067,7 +2072,7 @@
           <a:p>
             <a:fld id="{5B9580D5-5BBC-4C12-BE84-A18EAD3A5D00}" type="datetimeFigureOut">
               <a:rPr lang="en-US" smtClean="0"/>
-              <a:t>10/29/2020</a:t>
+              <a:t>10/31/2020</a:t>
             </a:fld>
             <a:endParaRPr lang="en-US"/>
           </a:p>
@@ -2378,7 +2383,7 @@
           <a:p>
             <a:fld id="{5B9580D5-5BBC-4C12-BE84-A18EAD3A5D00}" type="datetimeFigureOut">
               <a:rPr lang="en-US" smtClean="0"/>
-              <a:t>10/29/2020</a:t>
+              <a:t>10/31/2020</a:t>
             </a:fld>
             <a:endParaRPr lang="en-US"/>
           </a:p>
@@ -2666,7 +2671,7 @@
           <a:p>
             <a:fld id="{5B9580D5-5BBC-4C12-BE84-A18EAD3A5D00}" type="datetimeFigureOut">
               <a:rPr lang="en-US" smtClean="0"/>
-              <a:t>10/29/2020</a:t>
+              <a:t>10/31/2020</a:t>
             </a:fld>
             <a:endParaRPr lang="en-US"/>
           </a:p>
@@ -2907,7 +2912,7 @@
           <a:p>
             <a:fld id="{5B9580D5-5BBC-4C12-BE84-A18EAD3A5D00}" type="datetimeFigureOut">
               <a:rPr lang="en-US" smtClean="0"/>
-              <a:t>10/29/2020</a:t>
+              <a:t>10/31/2020</a:t>
             </a:fld>
             <a:endParaRPr lang="en-US"/>
           </a:p>
@@ -9889,41 +9894,6 @@
           </p:txBody>
         </p:sp>
       </p:grpSp>
-      <p:sp>
-        <p:nvSpPr>
-          <p:cNvPr id="464" name="TextBox 463">
-            <a:extLst>
-              <a:ext uri="{FF2B5EF4-FFF2-40B4-BE49-F238E27FC236}">
-                <a16:creationId xmlns:a16="http://schemas.microsoft.com/office/drawing/2014/main" id="{0A78A3D5-678F-4F0A-8E5B-6B10886724F0}"/>
-              </a:ext>
-            </a:extLst>
-          </p:cNvPr>
-          <p:cNvSpPr txBox="1"/>
-          <p:nvPr/>
-        </p:nvSpPr>
-        <p:spPr>
-          <a:xfrm>
-            <a:off x="1030400" y="6341806"/>
-            <a:ext cx="9870864" cy="369332"/>
-          </a:xfrm>
-          <a:prstGeom prst="rect">
-            <a:avLst/>
-          </a:prstGeom>
-          <a:noFill/>
-        </p:spPr>
-        <p:txBody>
-          <a:bodyPr wrap="square" rtlCol="0">
-            <a:spAutoFit/>
-          </a:bodyPr>
-          <a:lstStyle/>
-          <a:p>
-            <a:r>
-              <a:rPr lang="en-US" dirty="0"/>
-              <a:t>Median voter theorem – economists named it</a:t>
-            </a:r>
-          </a:p>
-        </p:txBody>
-      </p:sp>
       <p:grpSp>
         <p:nvGrpSpPr>
           <p:cNvPr id="465" name="Group 464">

</xml_diff>